<commit_message>
pdf, pptx con estilos en proceso
</commit_message>
<xml_diff>
--- a/IDERA/segmentos.censo2022.pptx
+++ b/IDERA/segmentos.censo2022.pptx
@@ -35,6 +35,9 @@
     <p:sldId id="278" r:id="rId30"/>
     <p:sldId id="279" r:id="rId31"/>
     <p:sldId id="280" r:id="rId32"/>
+    <p:sldId id="281" r:id="rId33"/>
+    <p:sldId id="282" r:id="rId34"/>
+    <p:sldId id="283" r:id="rId35"/>
   </p:sldIdLst>
   <p:sldSz cx="12192000" cy="6858000"/>
   <p:notesSz cx="7559675" cy="10691812"/>
@@ -9474,12 +9477,12 @@
       </p:grpSpPr>
       <p:sp>
         <p:nvSpPr>
-          <p:cNvPr id="2" name="Title 1"/>
-          <p:cNvSpPr>
-            <a:spLocks noGrp="1"/>
-          </p:cNvSpPr>
-          <p:nvPr>
-            <p:ph type="title"/>
+          <p:cNvPr id="3" name="Content Placeholder 2"/>
+          <p:cNvSpPr>
+            <a:spLocks noGrp="1"/>
+          </p:cNvSpPr>
+          <p:nvPr>
+            <p:ph idx="1"/>
           </p:nvPr>
         </p:nvSpPr>
         <p:spPr/>
@@ -9488,71 +9491,35 @@
           <a:lstStyle/>
           <a:p>
             <a:pPr lvl="0" indent="0" marL="0">
+              <a:spcBef>
+                <a:spcPts val="3000"/>
+              </a:spcBef>
               <a:buNone/>
             </a:pPr>
             <a:r>
-              <a:rPr/>
-              <a:t>Optimización global</a:t>
+              <a:rPr b="1"/>
+              <a:t>Elementos disponibles, o agrupación elemental.</a:t>
             </a:r>
           </a:p>
-        </p:txBody>
-      </p:sp>
-      <p:pic>
-        <p:nvPicPr>
-          <p:cNvPr descr="fig:  imagenes/optimizacion_global.png" id="0" name="Picture 1"/>
-          <p:cNvPicPr>
-            <a:picLocks noGrp="1" noChangeAspect="1"/>
-          </p:cNvPicPr>
-          <p:nvPr/>
-        </p:nvPicPr>
-        <p:blipFill>
-          <a:blip r:embed="rId2"/>
-          <a:stretch>
-            <a:fillRect/>
-          </a:stretch>
-        </p:blipFill>
-        <p:spPr bwMode="auto">
-          <a:xfrm>
-            <a:off x="939800" y="0"/>
-            <a:ext cx="10312400" cy="6350000"/>
-          </a:xfrm>
-          <a:prstGeom prst="rect">
-            <a:avLst/>
-          </a:prstGeom>
-          <a:noFill/>
-          <a:ln w="9525">
-            <a:noFill/>
-            <a:headEnd/>
-            <a:tailEnd/>
-          </a:ln>
-        </p:spPr>
-      </p:pic>
-      <p:sp>
-        <p:nvSpPr>
-          <p:cNvPr id="1" name="TextBox 3"/>
-          <p:cNvSpPr txBox="1"/>
-          <p:nvPr/>
-        </p:nvSpPr>
-        <p:spPr>
-          <a:xfrm>
-            <a:off x="0" y="6350000"/>
-            <a:ext cx="12192000" cy="508000"/>
-          </a:xfrm>
-          <a:prstGeom prst="rect">
-            <a:avLst/>
-          </a:prstGeom>
-          <a:noFill/>
-        </p:spPr>
-        <p:txBody>
-          <a:bodyPr/>
-          <a:lstStyle/>
-          <a:p>
-            <a:pPr lvl="0" indent="0" marL="0" algn="ctr">
-              <a:buNone/>
-            </a:pPr>
+          <a:p>
+            <a:pPr lvl="0"/>
             <a:r>
               <a:rPr/>
-              <a:t>OG</a:t>
+              <a:t>Conteos: lados o manzanas completas</a:t>
+            </a:r>
+          </a:p>
+          <a:p>
+            <a:pPr lvl="0"/>
+            <a:r>
+              <a:rPr/>
+              <a:t>Listados: direcciones, pisos (no puede haber más de 1 segmento por piso) recorridos o manzanas independientes</a:t>
+            </a:r>
+          </a:p>
+          <a:p>
+            <a:pPr lvl="0"/>
+            <a:r>
+              <a:rPr/>
+              <a:t>Varias combinaciones de ambos.</a:t>
             </a:r>
           </a:p>
         </p:txBody>
@@ -9579,6 +9546,188 @@
           <a:chExt cx="0" cy="0"/>
         </a:xfrm>
       </p:grpSpPr>
+      <p:sp>
+        <p:nvSpPr>
+          <p:cNvPr id="3" name="Content Placeholder 2"/>
+          <p:cNvSpPr>
+            <a:spLocks noGrp="1"/>
+          </p:cNvSpPr>
+          <p:nvPr>
+            <p:ph idx="1"/>
+          </p:nvPr>
+        </p:nvSpPr>
+        <p:spPr/>
+        <p:txBody>
+          <a:bodyPr/>
+          <a:lstStyle/>
+          <a:p>
+            <a:pPr lvl="0" indent="0" marL="0">
+              <a:spcBef>
+                <a:spcPts val="3000"/>
+              </a:spcBef>
+              <a:buNone/>
+            </a:pPr>
+            <a:r>
+              <a:rPr b="1"/>
+              <a:t>Algoritmos o Métodos.</a:t>
+            </a:r>
+          </a:p>
+        </p:txBody>
+      </p:sp>
+    </p:spTree>
+  </p:cSld>
+</p:sld>
+</file>
+
+<file path=ppt/slides/slide12.xml><?xml version="1.0" encoding="utf-8"?>
+<p:sld xmlns:a="http://schemas.openxmlformats.org/drawingml/2006/main" xmlns:r="http://schemas.openxmlformats.org/officeDocument/2006/relationships" xmlns:p="http://schemas.openxmlformats.org/presentationml/2006/main">
+  <p:cSld>
+    <p:spTree>
+      <p:nvGrpSpPr>
+        <p:cNvPr id="1" name=""/>
+        <p:cNvGrpSpPr/>
+        <p:nvPr/>
+      </p:nvGrpSpPr>
+      <p:grpSpPr>
+        <a:xfrm>
+          <a:off x="0" y="0"/>
+          <a:ext cx="0" cy="0"/>
+          <a:chOff x="0" y="0"/>
+          <a:chExt cx="0" cy="0"/>
+        </a:xfrm>
+      </p:grpSpPr>
+      <p:sp>
+        <p:nvSpPr>
+          <p:cNvPr id="2" name="Title 1"/>
+          <p:cNvSpPr>
+            <a:spLocks noGrp="1"/>
+          </p:cNvSpPr>
+          <p:nvPr>
+            <p:ph type="title"/>
+          </p:nvPr>
+        </p:nvSpPr>
+        <p:spPr/>
+        <p:txBody>
+          <a:bodyPr/>
+          <a:lstStyle/>
+          <a:p>
+            <a:pPr lvl="0" indent="0" marL="0">
+              <a:buNone/>
+            </a:pPr>
+            <a:r>
+              <a:rPr/>
+              <a:t>Optimización global</a:t>
+            </a:r>
+          </a:p>
+        </p:txBody>
+      </p:sp>
+      <p:pic>
+        <p:nvPicPr>
+          <p:cNvPr descr="fig:  imagenes/optimizacion_global.png" id="0" name="Picture 1"/>
+          <p:cNvPicPr>
+            <a:picLocks noGrp="1" noChangeAspect="1"/>
+          </p:cNvPicPr>
+          <p:nvPr/>
+        </p:nvPicPr>
+        <p:blipFill>
+          <a:blip r:embed="rId2"/>
+          <a:stretch>
+            <a:fillRect/>
+          </a:stretch>
+        </p:blipFill>
+        <p:spPr bwMode="auto">
+          <a:xfrm>
+            <a:off x="939800" y="0"/>
+            <a:ext cx="10312400" cy="6350000"/>
+          </a:xfrm>
+          <a:prstGeom prst="rect">
+            <a:avLst/>
+          </a:prstGeom>
+          <a:noFill/>
+          <a:ln w="9525">
+            <a:noFill/>
+            <a:headEnd/>
+            <a:tailEnd/>
+          </a:ln>
+        </p:spPr>
+      </p:pic>
+      <p:sp>
+        <p:nvSpPr>
+          <p:cNvPr id="1" name="TextBox 3"/>
+          <p:cNvSpPr txBox="1"/>
+          <p:nvPr/>
+        </p:nvSpPr>
+        <p:spPr>
+          <a:xfrm>
+            <a:off x="0" y="6350000"/>
+            <a:ext cx="12192000" cy="508000"/>
+          </a:xfrm>
+          <a:prstGeom prst="rect">
+            <a:avLst/>
+          </a:prstGeom>
+          <a:noFill/>
+        </p:spPr>
+        <p:txBody>
+          <a:bodyPr/>
+          <a:lstStyle/>
+          <a:p>
+            <a:pPr lvl="0" indent="0" marL="0" algn="ctr">
+              <a:buNone/>
+            </a:pPr>
+            <a:r>
+              <a:rPr/>
+              <a:t>Espacio de soluciones</a:t>
+            </a:r>
+          </a:p>
+        </p:txBody>
+      </p:sp>
+    </p:spTree>
+  </p:cSld>
+</p:sld>
+</file>
+
+<file path=ppt/slides/slide13.xml><?xml version="1.0" encoding="utf-8"?>
+<p:sld xmlns:a="http://schemas.openxmlformats.org/drawingml/2006/main" xmlns:r="http://schemas.openxmlformats.org/officeDocument/2006/relationships" xmlns:p="http://schemas.openxmlformats.org/presentationml/2006/main">
+  <p:cSld>
+    <p:spTree>
+      <p:nvGrpSpPr>
+        <p:cNvPr id="1" name=""/>
+        <p:cNvGrpSpPr/>
+        <p:nvPr/>
+      </p:nvGrpSpPr>
+      <p:grpSpPr>
+        <a:xfrm>
+          <a:off x="0" y="0"/>
+          <a:ext cx="0" cy="0"/>
+          <a:chOff x="0" y="0"/>
+          <a:chExt cx="0" cy="0"/>
+        </a:xfrm>
+      </p:grpSpPr>
+      <p:sp>
+        <p:nvSpPr>
+          <p:cNvPr id="2" name="Title 1"/>
+          <p:cNvSpPr>
+            <a:spLocks noGrp="1"/>
+          </p:cNvSpPr>
+          <p:nvPr>
+            <p:ph type="title"/>
+          </p:nvPr>
+        </p:nvSpPr>
+        <p:spPr/>
+        <p:txBody>
+          <a:bodyPr/>
+          <a:lstStyle/>
+          <a:p>
+            <a:pPr lvl="0" indent="0" marL="0">
+              <a:buNone/>
+            </a:pPr>
+            <a:r>
+              <a:rPr/>
+              <a:t>Generación de segmentaciones vecinas</a:t>
+            </a:r>
+          </a:p>
+        </p:txBody>
+      </p:sp>
       <p:pic>
         <p:nvPicPr>
           <p:cNvPr descr="fig:  imagenes/extraer.png" id="0" name="Picture 1"/>
@@ -9634,7 +9783,7 @@
             </a:pPr>
             <a:r>
               <a:rPr/>
-              <a:t>EC</a:t>
+              <a:t>Extraer componente</a:t>
             </a:r>
           </a:p>
         </p:txBody>
@@ -9644,7 +9793,7 @@
 </p:sld>
 </file>
 
-<file path=ppt/slides/slide12.xml><?xml version="1.0" encoding="utf-8"?>
+<file path=ppt/slides/slide14.xml><?xml version="1.0" encoding="utf-8"?>
 <p:sld xmlns:a="http://schemas.openxmlformats.org/drawingml/2006/main" xmlns:r="http://schemas.openxmlformats.org/officeDocument/2006/relationships" xmlns:p="http://schemas.openxmlformats.org/presentationml/2006/main">
   <p:cSld>
     <p:spTree>
@@ -9716,7 +9865,7 @@
             </a:pPr>
             <a:r>
               <a:rPr/>
-              <a:t>TC</a:t>
+              <a:t>Transferir componente</a:t>
             </a:r>
           </a:p>
         </p:txBody>
@@ -9726,7 +9875,7 @@
 </p:sld>
 </file>
 
-<file path=ppt/slides/slide13.xml><?xml version="1.0" encoding="utf-8"?>
+<file path=ppt/slides/slide15.xml><?xml version="1.0" encoding="utf-8"?>
 <p:sld xmlns:a="http://schemas.openxmlformats.org/drawingml/2006/main" xmlns:r="http://schemas.openxmlformats.org/officeDocument/2006/relationships" xmlns:p="http://schemas.openxmlformats.org/presentationml/2006/main">
   <p:cSld>
     <p:spTree>
@@ -9798,7 +9947,7 @@
             </a:pPr>
             <a:r>
               <a:rPr/>
-              <a:t>FD</a:t>
+              <a:t>Fusionar componente</a:t>
             </a:r>
           </a:p>
         </p:txBody>
@@ -9808,7 +9957,7 @@
 </p:sld>
 </file>
 
-<file path=ppt/slides/slide14.xml><?xml version="1.0" encoding="utf-8"?>
+<file path=ppt/slides/slide16.xml><?xml version="1.0" encoding="utf-8"?>
 <p:sld xmlns:a="http://schemas.openxmlformats.org/drawingml/2006/main" xmlns:r="http://schemas.openxmlformats.org/officeDocument/2006/relationships" xmlns:p="http://schemas.openxmlformats.org/presentationml/2006/main">
   <p:cSld>
     <p:spTree>
@@ -9869,7 +10018,7 @@
             <a:pPr lvl="0"/>
             <a:r>
               <a:rPr/>
-              <a:t>El segmento 90 y contiene las viviendas colectivas del radio.</a:t>
+              <a:t>El segmento 90 contiene las viviendas colectivas del radio.</a:t>
             </a:r>
           </a:p>
         </p:txBody>
@@ -9879,7 +10028,64 @@
 </p:sld>
 </file>
 
-<file path=ppt/slides/slide15.xml><?xml version="1.0" encoding="utf-8"?>
+<file path=ppt/slides/slide17.xml><?xml version="1.0" encoding="utf-8"?>
+<p:sld xmlns:a="http://schemas.openxmlformats.org/drawingml/2006/main" xmlns:r="http://schemas.openxmlformats.org/officeDocument/2006/relationships" xmlns:p="http://schemas.openxmlformats.org/presentationml/2006/main">
+  <p:cSld>
+    <p:spTree>
+      <p:nvGrpSpPr>
+        <p:cNvPr id="1" name=""/>
+        <p:cNvGrpSpPr/>
+        <p:nvPr/>
+      </p:nvGrpSpPr>
+      <p:grpSpPr>
+        <a:xfrm>
+          <a:off x="0" y="0"/>
+          <a:ext cx="0" cy="0"/>
+          <a:chOff x="0" y="0"/>
+          <a:chExt cx="0" cy="0"/>
+        </a:xfrm>
+      </p:grpSpPr>
+      <p:sp>
+        <p:nvSpPr>
+          <p:cNvPr id="3" name="Content Placeholder 2"/>
+          <p:cNvSpPr>
+            <a:spLocks noGrp="1"/>
+          </p:cNvSpPr>
+          <p:nvPr>
+            <p:ph idx="1"/>
+          </p:nvPr>
+        </p:nvSpPr>
+        <p:spPr/>
+        <p:txBody>
+          <a:bodyPr/>
+          <a:lstStyle/>
+          <a:p>
+            <a:pPr lvl="0" indent="0" marL="0">
+              <a:spcBef>
+                <a:spcPts val="3000"/>
+              </a:spcBef>
+              <a:buNone/>
+            </a:pPr>
+            <a:r>
+              <a:rPr b="1"/>
+              <a:t>Descripción del problema.</a:t>
+            </a:r>
+          </a:p>
+          <a:p>
+            <a:pPr lvl="0"/>
+            <a:r>
+              <a:rPr/>
+              <a:t>Armar el recorrido de 650.000 censistas para que visiten todas las viviendas del territorio siguiendo las reglas definidas en el MANUAL del SEGMENTADOR.</a:t>
+            </a:r>
+          </a:p>
+        </p:txBody>
+      </p:sp>
+    </p:spTree>
+  </p:cSld>
+</p:sld>
+</file>
+
+<file path=ppt/slides/slide18.xml><?xml version="1.0" encoding="utf-8"?>
 <p:sld xmlns:a="http://schemas.openxmlformats.org/drawingml/2006/main" xmlns:r="http://schemas.openxmlformats.org/officeDocument/2006/relationships" xmlns:p="http://schemas.openxmlformats.org/presentationml/2006/main">
   <p:cSld>
     <p:spTree>
@@ -9921,16 +10127,7 @@
                 </a:pPr>
                 <a:r>
                   <a:rPr b="1"/>
-                  <a:t>Descripción del problema.</a:t>
-                </a:r>
-              </a:p>
-              <a:p>
-                <a:pPr lvl="0" indent="0" marL="0">
-                  <a:buNone/>
-                </a:pPr>
-                <a:r>
-                  <a:rPr/>
-                  <a:t>Armar el recorrido de 650.000 censistas para que visiten todas las viviendas del territorio siguiendo las reglas definidas en el MANUAL del SEGMENTADOR</a:t>
+                  <a:t>El problema</a:t>
                 </a:r>
               </a:p>
               <a:p>
@@ -10029,7 +10226,7 @@
 </p:sld>
 </file>
 
-<file path=ppt/slides/slide16.xml><?xml version="1.0" encoding="utf-8"?>
+<file path=ppt/slides/slide19.xml><?xml version="1.0" encoding="utf-8"?>
 <p:sld xmlns:a="http://schemas.openxmlformats.org/drawingml/2006/main" xmlns:r="http://schemas.openxmlformats.org/officeDocument/2006/relationships" xmlns:p="http://schemas.openxmlformats.org/presentationml/2006/main">
   <p:cSld>
     <p:spTree>
@@ -10079,7 +10276,7 @@
 </p:sld>
 </file>
 
-<file path=ppt/slides/slide17.xml><?xml version="1.0" encoding="utf-8"?>
+<file path=ppt/slides/slide2.xml><?xml version="1.0" encoding="utf-8"?>
 <p:sld xmlns:a="http://schemas.openxmlformats.org/drawingml/2006/main" xmlns:r="http://schemas.openxmlformats.org/officeDocument/2006/relationships" xmlns:p="http://schemas.openxmlformats.org/presentationml/2006/main">
   <p:cSld>
     <p:spTree>
@@ -10112,42 +10309,11 @@
           <a:lstStyle/>
           <a:p>
             <a:pPr lvl="0" indent="0" marL="0">
-              <a:spcBef>
-                <a:spcPts val="3000"/>
-              </a:spcBef>
               <a:buNone/>
             </a:pPr>
             <a:r>
-              <a:rPr b="1"/>
-              <a:t>Función objetivo con costo que incluye penalidad</a:t>
-            </a:r>
-          </a:p>
-          <a:p>
-            <a:pPr lvl="0"/>
-            <a:r>
               <a:rPr/>
-              <a:t>cantidad de viviendas por segmento</a:t>
-            </a:r>
-          </a:p>
-          <a:p>
-            <a:pPr lvl="0"/>
-            <a:r>
-              <a:rPr/>
-              <a:t>cantidad de manzanas por segmento</a:t>
-            </a:r>
-          </a:p>
-          <a:p>
-            <a:pPr lvl="0"/>
-            <a:r>
-              <a:rPr/>
-              <a:t>cantidad de segmentos</a:t>
-            </a:r>
-          </a:p>
-          <a:p>
-            <a:pPr lvl="0"/>
-            <a:r>
-              <a:rPr/>
-              <a:t>cantidad de lados delimitando segmentos</a:t>
+              <a:t>class: center, inverse background-image: url(“plantilla_idera_html/img0.png”)</a:t>
             </a:r>
           </a:p>
         </p:txBody>
@@ -10157,7 +10323,7 @@
 </p:sld>
 </file>
 
-<file path=ppt/slides/slide18.xml><?xml version="1.0" encoding="utf-8"?>
+<file path=ppt/slides/slide20.xml><?xml version="1.0" encoding="utf-8"?>
 <p:sld xmlns:a="http://schemas.openxmlformats.org/drawingml/2006/main" xmlns:r="http://schemas.openxmlformats.org/officeDocument/2006/relationships" xmlns:p="http://schemas.openxmlformats.org/presentationml/2006/main">
   <p:cSld>
     <p:spTree>
@@ -10197,7 +10363,35 @@
             </a:pPr>
             <a:r>
               <a:rPr b="1"/>
-              <a:t>Espacio factible definido por vecindario de segmentación</a:t>
+              <a:t>Función objetivo con costo que incluye penalidad</a:t>
+            </a:r>
+          </a:p>
+          <a:p>
+            <a:pPr lvl="0"/>
+            <a:r>
+              <a:rPr/>
+              <a:t>cantidad de viviendas por segmento</a:t>
+            </a:r>
+          </a:p>
+          <a:p>
+            <a:pPr lvl="0"/>
+            <a:r>
+              <a:rPr/>
+              <a:t>cantidad de manzanas por segmento</a:t>
+            </a:r>
+          </a:p>
+          <a:p>
+            <a:pPr lvl="0"/>
+            <a:r>
+              <a:rPr/>
+              <a:t>cantidad de segmentos</a:t>
+            </a:r>
+          </a:p>
+          <a:p>
+            <a:pPr lvl="0"/>
+            <a:r>
+              <a:rPr/>
+              <a:t>cantidad de lados delimitando segmentos</a:t>
             </a:r>
           </a:p>
         </p:txBody>
@@ -10207,7 +10401,57 @@
 </p:sld>
 </file>
 
-<file path=ppt/slides/slide19.xml><?xml version="1.0" encoding="utf-8"?>
+<file path=ppt/slides/slide21.xml><?xml version="1.0" encoding="utf-8"?>
+<p:sld xmlns:a="http://schemas.openxmlformats.org/drawingml/2006/main" xmlns:r="http://schemas.openxmlformats.org/officeDocument/2006/relationships" xmlns:p="http://schemas.openxmlformats.org/presentationml/2006/main">
+  <p:cSld>
+    <p:spTree>
+      <p:nvGrpSpPr>
+        <p:cNvPr id="1" name=""/>
+        <p:cNvGrpSpPr/>
+        <p:nvPr/>
+      </p:nvGrpSpPr>
+      <p:grpSpPr>
+        <a:xfrm>
+          <a:off x="0" y="0"/>
+          <a:ext cx="0" cy="0"/>
+          <a:chOff x="0" y="0"/>
+          <a:chExt cx="0" cy="0"/>
+        </a:xfrm>
+      </p:grpSpPr>
+      <p:sp>
+        <p:nvSpPr>
+          <p:cNvPr id="3" name="Content Placeholder 2"/>
+          <p:cNvSpPr>
+            <a:spLocks noGrp="1"/>
+          </p:cNvSpPr>
+          <p:nvPr>
+            <p:ph idx="1"/>
+          </p:nvPr>
+        </p:nvSpPr>
+        <p:spPr/>
+        <p:txBody>
+          <a:bodyPr/>
+          <a:lstStyle/>
+          <a:p>
+            <a:pPr lvl="0" indent="0" marL="0">
+              <a:spcBef>
+                <a:spcPts val="3000"/>
+              </a:spcBef>
+              <a:buNone/>
+            </a:pPr>
+            <a:r>
+              <a:rPr b="1"/>
+              <a:t>Espacio factible definido por vecindario de segmentación</a:t>
+            </a:r>
+          </a:p>
+        </p:txBody>
+      </p:sp>
+    </p:spTree>
+  </p:cSld>
+</p:sld>
+</file>
+
+<file path=ppt/slides/slide22.xml><?xml version="1.0" encoding="utf-8"?>
 <p:sld xmlns:a="http://schemas.openxmlformats.org/drawingml/2006/main" xmlns:r="http://schemas.openxmlformats.org/officeDocument/2006/relationships" xmlns:p="http://schemas.openxmlformats.org/presentationml/2006/main">
   <p:cSld>
     <p:spTree>
@@ -10339,7 +10583,7 @@
 </p:sld>
 </file>
 
-<file path=ppt/slides/slide2.xml><?xml version="1.0" encoding="utf-8"?>
+<file path=ppt/slides/slide23.xml><?xml version="1.0" encoding="utf-8"?>
 <p:sld xmlns:a="http://schemas.openxmlformats.org/drawingml/2006/main" xmlns:r="http://schemas.openxmlformats.org/officeDocument/2006/relationships" xmlns:p="http://schemas.openxmlformats.org/presentationml/2006/main">
   <p:cSld>
     <p:spTree>
@@ -10358,53 +10602,6 @@
       </p:grpSpPr>
       <p:sp>
         <p:nvSpPr>
-          <p:cNvPr id="3" name="Content Placeholder 2"/>
-          <p:cNvSpPr>
-            <a:spLocks noGrp="1"/>
-          </p:cNvSpPr>
-          <p:nvPr>
-            <p:ph idx="1"/>
-          </p:nvPr>
-        </p:nvSpPr>
-        <p:spPr/>
-        <p:txBody>
-          <a:bodyPr/>
-          <a:lstStyle/>
-          <a:p>
-            <a:pPr lvl="0" indent="0" marL="0">
-              <a:buNone/>
-            </a:pPr>
-            <a:r>
-              <a:rPr/>
-              <a:t>class: center, inverse background-image: url(“plantilla_idera_html/img0.png”)</a:t>
-            </a:r>
-          </a:p>
-        </p:txBody>
-      </p:sp>
-    </p:spTree>
-  </p:cSld>
-</p:sld>
-</file>
-
-<file path=ppt/slides/slide20.xml><?xml version="1.0" encoding="utf-8"?>
-<p:sld xmlns:a="http://schemas.openxmlformats.org/drawingml/2006/main" xmlns:r="http://schemas.openxmlformats.org/officeDocument/2006/relationships" xmlns:p="http://schemas.openxmlformats.org/presentationml/2006/main">
-  <p:cSld>
-    <p:spTree>
-      <p:nvGrpSpPr>
-        <p:cNvPr id="1" name=""/>
-        <p:cNvGrpSpPr/>
-        <p:nvPr/>
-      </p:nvGrpSpPr>
-      <p:grpSpPr>
-        <a:xfrm>
-          <a:off x="0" y="0"/>
-          <a:ext cx="0" cy="0"/>
-          <a:chOff x="0" y="0"/>
-          <a:chExt cx="0" cy="0"/>
-        </a:xfrm>
-      </p:grpSpPr>
-      <p:sp>
-        <p:nvSpPr>
           <p:cNvPr id="2" name="Title 1"/>
           <p:cNvSpPr>
             <a:spLocks noGrp="1"/>
@@ -10461,7 +10658,7 @@
 </p:sld>
 </file>
 
-<file path=ppt/slides/slide21.xml><?xml version="1.0" encoding="utf-8"?>
+<file path=ppt/slides/slide24.xml><?xml version="1.0" encoding="utf-8"?>
 <p:sld xmlns:a="http://schemas.openxmlformats.org/drawingml/2006/main" xmlns:r="http://schemas.openxmlformats.org/officeDocument/2006/relationships" xmlns:p="http://schemas.openxmlformats.org/presentationml/2006/main">
   <p:cSld>
     <p:spTree>
@@ -10543,7 +10740,7 @@
 </p:sld>
 </file>
 
-<file path=ppt/slides/slide22.xml><?xml version="1.0" encoding="utf-8"?>
+<file path=ppt/slides/slide25.xml><?xml version="1.0" encoding="utf-8"?>
 <p:sld xmlns:a="http://schemas.openxmlformats.org/drawingml/2006/main" xmlns:r="http://schemas.openxmlformats.org/officeDocument/2006/relationships" xmlns:p="http://schemas.openxmlformats.org/presentationml/2006/main">
   <p:cSld>
     <p:spTree>
@@ -10590,7 +10787,7 @@
 </p:sld>
 </file>
 
-<file path=ppt/slides/slide23.xml><?xml version="1.0" encoding="utf-8"?>
+<file path=ppt/slides/slide26.xml><?xml version="1.0" encoding="utf-8"?>
 <p:sld xmlns:a="http://schemas.openxmlformats.org/drawingml/2006/main" xmlns:r="http://schemas.openxmlformats.org/officeDocument/2006/relationships" xmlns:p="http://schemas.openxmlformats.org/presentationml/2006/main">
   <p:cSld>
     <p:spTree>
@@ -10637,7 +10834,7 @@
 </p:sld>
 </file>
 
-<file path=ppt/slides/slide24.xml><?xml version="1.0" encoding="utf-8"?>
+<file path=ppt/slides/slide27.xml><?xml version="1.0" encoding="utf-8"?>
 <p:sld xmlns:a="http://schemas.openxmlformats.org/drawingml/2006/main" xmlns:r="http://schemas.openxmlformats.org/officeDocument/2006/relationships" xmlns:p="http://schemas.openxmlformats.org/presentationml/2006/main">
   <p:cSld>
     <p:spTree>
@@ -10744,7 +10941,7 @@
 </p:sld>
 </file>
 
-<file path=ppt/slides/slide25.xml><?xml version="1.0" encoding="utf-8"?>
+<file path=ppt/slides/slide28.xml><?xml version="1.0" encoding="utf-8"?>
 <p:sld xmlns:a="http://schemas.openxmlformats.org/drawingml/2006/main" xmlns:r="http://schemas.openxmlformats.org/officeDocument/2006/relationships" xmlns:p="http://schemas.openxmlformats.org/presentationml/2006/main">
   <p:cSld>
     <p:spTree>
@@ -10865,7 +11062,16 @@
             </a:pPr>
             <a:r>
               <a:rPr/>
-              <a:t>Es la tarea que permite subdividir el radio censal en unidades operativas menores llamadas segmentos. Para asegurar que todas las viviendas y personas sean censadas, es necesario determinar con anterioridad el área que deberán recorrer los censistas y la carga de trabajo que se le asignará a cada uno de ellos.</a:t>
+              <a:t>Es la tarea que permite subdividir el radio censal en segmentos.</a:t>
+            </a:r>
+          </a:p>
+          <a:p>
+            <a:pPr lvl="0" indent="0" marL="0">
+              <a:buNone/>
+            </a:pPr>
+            <a:r>
+              <a:rPr/>
+              <a:t>Para asegurar que todas las viviendas sean censadas, hay que determinar qué área y qué viviendas le corresponden a cada censista.</a:t>
             </a:r>
           </a:p>
         </p:txBody>
@@ -11023,7 +11229,7 @@
             </a:pPr>
             <a:r>
               <a:rPr/>
-              <a:t>población agrupada únicamente, y conformado por manzanas y/o sectores pertenecientes a una localidad.</a:t>
+              <a:t>— población agrupada únicamente, y conformado por manzanas y/o sectores pertenecientes a una localidad. —</a:t>
             </a:r>
           </a:p>
           <a:p>
@@ -11039,7 +11245,7 @@
             </a:pPr>
             <a:r>
               <a:rPr/>
-              <a:t>agrupada en pequeños poblados o en bordes amanzanados de localidades.</a:t>
+              <a:t>— agrupada en pequeños poblados o en bordes amanzanados de localidades. —</a:t>
             </a:r>
           </a:p>
         </p:txBody>
@@ -11089,21 +11295,21 @@
             </a:pPr>
             <a:r>
               <a:rPr b="1"/>
-              <a:t>Límites del segmento</a:t>
+              <a:t>Delimitación del segmento</a:t>
             </a:r>
           </a:p>
           <a:p>
             <a:pPr lvl="0"/>
             <a:r>
               <a:rPr/>
-              <a:t>Todo espacio con o sin viviendas debe estar asignado a algún segmento.</a:t>
+              <a:t>Todo espacio (con o sin viviendas) debe estar asignado a un segmento.</a:t>
             </a:r>
           </a:p>
           <a:p>
             <a:pPr lvl="0"/>
             <a:r>
               <a:rPr/>
-              <a:t>Identificar claramente Inicio y Fin de cada uno.</a:t>
+              <a:t>Identificar claramente Inicio y Fin de cada segmento.</a:t>
             </a:r>
           </a:p>
         </p:txBody>
@@ -11172,28 +11378,21 @@
             <a:pPr lvl="0"/>
             <a:r>
               <a:rPr/>
-              <a:t>recorridos discontinuo</a:t>
+              <a:t>Recorrido discontinuo</a:t>
             </a:r>
           </a:p>
           <a:p>
             <a:pPr lvl="0"/>
             <a:r>
               <a:rPr/>
-              <a:t>Cruces en diagonal</a:t>
+              <a:t>Cruce en diagonal</a:t>
             </a:r>
           </a:p>
           <a:p>
             <a:pPr lvl="0"/>
             <a:r>
               <a:rPr/>
-              <a:t>En lo posible cruces de avenidas, rutas, vías de ferrocarril o cursos de agua.</a:t>
-            </a:r>
-          </a:p>
-          <a:p>
-            <a:pPr lvl="0"/>
-            <a:r>
-              <a:rPr/>
-              <a:t>Identificar claramente INICIO y FIN de cada segmento.</a:t>
+              <a:t>“En lo posible” cruce de avenidas, rutas, vías de ferrocarril o cursos de agua.</a:t>
             </a:r>
           </a:p>
         </p:txBody>
@@ -11300,7 +11499,7 @@
             </a:pPr>
             <a:r>
               <a:rPr/>
-              <a:t>M</a:t>
+              <a:t>Mapas de análisis</a:t>
             </a:r>
           </a:p>
         </p:txBody>
@@ -11350,48 +11549,6 @@
             </a:pPr>
             <a:r>
               <a:rPr b="1"/>
-              <a:t>Descripción más precisa y Definiciones.</a:t>
-            </a:r>
-          </a:p>
-          <a:p>
-            <a:pPr lvl="0" indent="0" marL="0">
-              <a:buNone/>
-            </a:pPr>
-            <a:r>
-              <a:rPr/>
-              <a:t>Los segmentos deberán tener:</a:t>
-            </a:r>
-          </a:p>
-          <a:p>
-            <a:pPr lvl="0"/>
-            <a:r>
-              <a:rPr/>
-              <a:t>Una carga.</a:t>
-            </a:r>
-          </a:p>
-          <a:p>
-            <a:pPr lvl="0"/>
-            <a:r>
-              <a:rPr/>
-              <a:t>Continuidad.</a:t>
-            </a:r>
-          </a:p>
-          <a:p>
-            <a:pPr lvl="0"/>
-            <a:r>
-              <a:rPr/>
-              <a:t>Recorrido.</a:t>
-            </a:r>
-          </a:p>
-          <a:p>
-            <a:pPr lvl="0" indent="0" marL="0">
-              <a:spcBef>
-                <a:spcPts val="3000"/>
-              </a:spcBef>
-              <a:buNone/>
-            </a:pPr>
-            <a:r>
-              <a:rPr b="1"/>
               <a:t>Tipos de Radios Urbanos o parte Urbana de Radios Mixtos</a:t>
             </a:r>
           </a:p>
@@ -11425,52 +11582,7 @@
             <a:pPr lvl="0"/>
             <a:r>
               <a:rPr/>
-              <a:t>Combinados: situaciones intermedias algunas manzanas con pocas viviendas o algunos lados con muchas viviendas.</a:t>
-            </a:r>
-          </a:p>
-          <a:p>
-            <a:pPr lvl="0" indent="0" marL="0">
-              <a:spcBef>
-                <a:spcPts val="3000"/>
-              </a:spcBef>
-              <a:buNone/>
-            </a:pPr>
-            <a:r>
-              <a:rPr b="1"/>
-              <a:t>Algoritmos o Métodos.</a:t>
-            </a:r>
-          </a:p>
-          <a:p>
-            <a:pPr lvl="0" indent="0" marL="0">
-              <a:spcBef>
-                <a:spcPts val="3000"/>
-              </a:spcBef>
-              <a:buNone/>
-            </a:pPr>
-            <a:r>
-              <a:rPr b="1"/>
-              <a:t>Elementos disponibles, o agrupación elemental.</a:t>
-            </a:r>
-          </a:p>
-          <a:p>
-            <a:pPr lvl="0"/>
-            <a:r>
-              <a:rPr/>
-              <a:t>Conteos: lados o manzanas completas</a:t>
-            </a:r>
-          </a:p>
-          <a:p>
-            <a:pPr lvl="0"/>
-            <a:r>
-              <a:rPr/>
-              <a:t>Listados: direcciones, pisos (no puede haber más de 1 segmento por piso) recorridos o manzanas independientes</a:t>
-            </a:r>
-          </a:p>
-          <a:p>
-            <a:pPr lvl="0"/>
-            <a:r>
-              <a:rPr/>
-              <a:t>Varias combinaciones de ambos.</a:t>
+              <a:t>Combinados: situaciones intermedias, algunas manzanas con pocas viviendas o algunos lados con muchas viviendas.</a:t>
             </a:r>
           </a:p>
         </p:txBody>

</xml_diff>